<commit_message>
Updated ASV bubbleplot class v1 annotated.pptx and ASV bubbleplot class v1 annotated.png with correct post hocs. Updated sig.asvs.v2.csv with correct otu order. Updated sig.asvs.blast.data.xlsx with blast data and relevant papers.
</commit_message>
<xml_diff>
--- a/figures/ASV bubbleplot class v1 annotated.pptx
+++ b/figures/ASV bubbleplot class v1 annotated.pptx
@@ -104,6 +104,11 @@
       </a:defRPr>
     </a:lvl9pPr>
   </p:defaultTextStyle>
+  <p:extLst>
+    <p:ext uri="{EFAFB233-063F-42B5-8137-9DF3F51BA10A}">
+      <p15:sldGuideLst xmlns:p15="http://schemas.microsoft.com/office/powerpoint/2012/main"/>
+    </p:ext>
+  </p:extLst>
 </p:presentation>
 </file>
 
@@ -238,7 +243,7 @@
           <a:p>
             <a:fld id="{AF2D935F-D9F3-46D0-9E40-20744E0564D5}" type="datetimeFigureOut">
               <a:rPr lang="en-US" smtClean="0"/>
-              <a:t>4/10/2022</a:t>
+              <a:t>5/1/2022</a:t>
             </a:fld>
             <a:endParaRPr lang="en-US"/>
           </a:p>
@@ -408,7 +413,7 @@
           <a:p>
             <a:fld id="{AF2D935F-D9F3-46D0-9E40-20744E0564D5}" type="datetimeFigureOut">
               <a:rPr lang="en-US" smtClean="0"/>
-              <a:t>4/10/2022</a:t>
+              <a:t>5/1/2022</a:t>
             </a:fld>
             <a:endParaRPr lang="en-US"/>
           </a:p>
@@ -588,7 +593,7 @@
           <a:p>
             <a:fld id="{AF2D935F-D9F3-46D0-9E40-20744E0564D5}" type="datetimeFigureOut">
               <a:rPr lang="en-US" smtClean="0"/>
-              <a:t>4/10/2022</a:t>
+              <a:t>5/1/2022</a:t>
             </a:fld>
             <a:endParaRPr lang="en-US"/>
           </a:p>
@@ -758,7 +763,7 @@
           <a:p>
             <a:fld id="{AF2D935F-D9F3-46D0-9E40-20744E0564D5}" type="datetimeFigureOut">
               <a:rPr lang="en-US" smtClean="0"/>
-              <a:t>4/10/2022</a:t>
+              <a:t>5/1/2022</a:t>
             </a:fld>
             <a:endParaRPr lang="en-US"/>
           </a:p>
@@ -1002,7 +1007,7 @@
           <a:p>
             <a:fld id="{AF2D935F-D9F3-46D0-9E40-20744E0564D5}" type="datetimeFigureOut">
               <a:rPr lang="en-US" smtClean="0"/>
-              <a:t>4/10/2022</a:t>
+              <a:t>5/1/2022</a:t>
             </a:fld>
             <a:endParaRPr lang="en-US"/>
           </a:p>
@@ -1234,7 +1239,7 @@
           <a:p>
             <a:fld id="{AF2D935F-D9F3-46D0-9E40-20744E0564D5}" type="datetimeFigureOut">
               <a:rPr lang="en-US" smtClean="0"/>
-              <a:t>4/10/2022</a:t>
+              <a:t>5/1/2022</a:t>
             </a:fld>
             <a:endParaRPr lang="en-US"/>
           </a:p>
@@ -1601,7 +1606,7 @@
           <a:p>
             <a:fld id="{AF2D935F-D9F3-46D0-9E40-20744E0564D5}" type="datetimeFigureOut">
               <a:rPr lang="en-US" smtClean="0"/>
-              <a:t>4/10/2022</a:t>
+              <a:t>5/1/2022</a:t>
             </a:fld>
             <a:endParaRPr lang="en-US"/>
           </a:p>
@@ -1719,7 +1724,7 @@
           <a:p>
             <a:fld id="{AF2D935F-D9F3-46D0-9E40-20744E0564D5}" type="datetimeFigureOut">
               <a:rPr lang="en-US" smtClean="0"/>
-              <a:t>4/10/2022</a:t>
+              <a:t>5/1/2022</a:t>
             </a:fld>
             <a:endParaRPr lang="en-US"/>
           </a:p>
@@ -1814,7 +1819,7 @@
           <a:p>
             <a:fld id="{AF2D935F-D9F3-46D0-9E40-20744E0564D5}" type="datetimeFigureOut">
               <a:rPr lang="en-US" smtClean="0"/>
-              <a:t>4/10/2022</a:t>
+              <a:t>5/1/2022</a:t>
             </a:fld>
             <a:endParaRPr lang="en-US"/>
           </a:p>
@@ -2091,7 +2096,7 @@
           <a:p>
             <a:fld id="{AF2D935F-D9F3-46D0-9E40-20744E0564D5}" type="datetimeFigureOut">
               <a:rPr lang="en-US" smtClean="0"/>
-              <a:t>4/10/2022</a:t>
+              <a:t>5/1/2022</a:t>
             </a:fld>
             <a:endParaRPr lang="en-US"/>
           </a:p>
@@ -2348,7 +2353,7 @@
           <a:p>
             <a:fld id="{AF2D935F-D9F3-46D0-9E40-20744E0564D5}" type="datetimeFigureOut">
               <a:rPr lang="en-US" smtClean="0"/>
-              <a:t>4/10/2022</a:t>
+              <a:t>5/1/2022</a:t>
             </a:fld>
             <a:endParaRPr lang="en-US"/>
           </a:p>
@@ -2561,7 +2566,7 @@
           <a:p>
             <a:fld id="{AF2D935F-D9F3-46D0-9E40-20744E0564D5}" type="datetimeFigureOut">
               <a:rPr lang="en-US" smtClean="0"/>
-              <a:t>4/10/2022</a:t>
+              <a:t>5/1/2022</a:t>
             </a:fld>
             <a:endParaRPr lang="en-US"/>
           </a:p>
@@ -3431,9 +3436,9 @@
           <p:nvPr/>
         </p:nvSpPr>
         <p:spPr>
-          <a:xfrm>
-            <a:off x="15402496" y="9132769"/>
-            <a:ext cx="1527639" cy="302183"/>
+          <a:xfrm flipH="1">
+            <a:off x="14653348" y="9132769"/>
+            <a:ext cx="1508307" cy="302183"/>
           </a:xfrm>
           <a:prstGeom prst="rect">
             <a:avLst/>
@@ -3692,8 +3697,8 @@
         </p:nvSpPr>
         <p:spPr>
           <a:xfrm>
-            <a:off x="14689119" y="19025826"/>
-            <a:ext cx="695786" cy="298851"/>
+            <a:off x="15400811" y="19021063"/>
+            <a:ext cx="760843" cy="298851"/>
           </a:xfrm>
           <a:prstGeom prst="rect">
             <a:avLst/>
@@ -3701,7 +3706,7 @@
           <a:noFill/>
           <a:ln w="38100">
             <a:solidFill>
-              <a:srgbClr val="C9A8FF"/>
+              <a:srgbClr val="FFBAA4"/>
             </a:solidFill>
           </a:ln>
         </p:spPr>
@@ -3847,9 +3852,9 @@
           <p:nvPr/>
         </p:nvSpPr>
         <p:spPr>
-          <a:xfrm>
-            <a:off x="15402496" y="20798464"/>
-            <a:ext cx="1527639" cy="302183"/>
+          <a:xfrm flipH="1">
+            <a:off x="14689118" y="20798464"/>
+            <a:ext cx="1472538" cy="302183"/>
           </a:xfrm>
           <a:prstGeom prst="rect">
             <a:avLst/>

</xml_diff>